<commit_message>
Adicionada atualizações no projeto
</commit_message>
<xml_diff>
--- a/AngularIonic.pptx
+++ b/AngularIonic.pptx
@@ -1,6 +1,6 @@
 
 <file path=ppt/presentation.xml><?xml version="1.0" encoding="utf-8"?>
-<p:presentation xmlns:a="http://schemas.openxmlformats.org/drawingml/2006/main" xmlns:r="http://schemas.openxmlformats.org/officeDocument/2006/relationships" xmlns:p="http://schemas.openxmlformats.org/presentationml/2006/main" strictFirstAndLastChars="0" embedTrueTypeFonts="1" saveSubsetFonts="1" autoCompressPictures="0">
+<p:presentation xmlns:a="http://schemas.openxmlformats.org/drawingml/2006/main" xmlns:r="http://schemas.openxmlformats.org/officeDocument/2006/relationships" xmlns:p="http://schemas.openxmlformats.org/presentationml/2006/main" strictFirstAndLastChars="0" saveSubsetFonts="1" autoCompressPictures="0">
   <p:sldMasterIdLst>
     <p:sldMasterId id="2147483659" r:id="rId1"/>
   </p:sldMasterIdLst>
@@ -9,8 +9,8 @@
   </p:notesMasterIdLst>
   <p:sldIdLst>
     <p:sldId id="267" r:id="rId2"/>
-    <p:sldId id="268" r:id="rId3"/>
-    <p:sldId id="269" r:id="rId4"/>
+    <p:sldId id="269" r:id="rId3"/>
+    <p:sldId id="268" r:id="rId4"/>
     <p:sldId id="284" r:id="rId5"/>
     <p:sldId id="270" r:id="rId6"/>
     <p:sldId id="271" r:id="rId7"/>
@@ -29,22 +29,6 @@
   </p:sldIdLst>
   <p:sldSz cx="9144000" cy="5143500" type="screen16x9"/>
   <p:notesSz cx="6858000" cy="9144000"/>
-  <p:embeddedFontLst>
-    <p:embeddedFont>
-      <p:font typeface="Roboto" panose="02000000000000000000" pitchFamily="2" charset="0"/>
-      <p:regular r:id="rId21"/>
-      <p:bold r:id="rId22"/>
-      <p:italic r:id="rId23"/>
-      <p:boldItalic r:id="rId24"/>
-    </p:embeddedFont>
-    <p:embeddedFont>
-      <p:font typeface="Lato" panose="020B0604020202020204" charset="0"/>
-      <p:regular r:id="rId25"/>
-      <p:bold r:id="rId26"/>
-      <p:italic r:id="rId27"/>
-      <p:boldItalic r:id="rId28"/>
-    </p:embeddedFont>
-  </p:embeddedFontLst>
   <p:defaultTextStyle>
     <a:defPPr marR="0" lvl="0" algn="l" rtl="0">
       <a:lnSpc>
@@ -1552,6 +1536,107 @@
   <p:cSld>
     <p:spTree>
       <p:nvGrpSpPr>
+        <p:cNvPr id="1" name="Shape 216"/>
+        <p:cNvGrpSpPr/>
+        <p:nvPr/>
+      </p:nvGrpSpPr>
+      <p:grpSpPr>
+        <a:xfrm>
+          <a:off x="0" y="0"/>
+          <a:ext cx="0" cy="0"/>
+          <a:chOff x="0" y="0"/>
+          <a:chExt cx="0" cy="0"/>
+        </a:xfrm>
+      </p:grpSpPr>
+      <p:sp>
+        <p:nvSpPr>
+          <p:cNvPr id="217" name="Shape 217"/>
+          <p:cNvSpPr>
+            <a:spLocks noGrp="1" noRot="1" noChangeAspect="1"/>
+          </p:cNvSpPr>
+          <p:nvPr>
+            <p:ph type="sldImg" idx="2"/>
+          </p:nvPr>
+        </p:nvSpPr>
+        <p:spPr>
+          <a:xfrm>
+            <a:off x="381000" y="685800"/>
+            <a:ext cx="6096000" cy="3429000"/>
+          </a:xfrm>
+          <a:custGeom>
+            <a:avLst/>
+            <a:gdLst/>
+            <a:ahLst/>
+            <a:cxnLst/>
+            <a:rect l="0" t="0" r="0" b="0"/>
+            <a:pathLst>
+              <a:path w="120000" h="120000" extrusionOk="0">
+                <a:moveTo>
+                  <a:pt x="0" y="0"/>
+                </a:moveTo>
+                <a:lnTo>
+                  <a:pt x="120000" y="0"/>
+                </a:lnTo>
+                <a:lnTo>
+                  <a:pt x="120000" y="120000"/>
+                </a:lnTo>
+                <a:lnTo>
+                  <a:pt x="0" y="120000"/>
+                </a:lnTo>
+                <a:close/>
+              </a:path>
+            </a:pathLst>
+          </a:custGeom>
+        </p:spPr>
+      </p:sp>
+      <p:sp>
+        <p:nvSpPr>
+          <p:cNvPr id="218" name="Shape 218"/>
+          <p:cNvSpPr txBox="1">
+            <a:spLocks noGrp="1"/>
+          </p:cNvSpPr>
+          <p:nvPr>
+            <p:ph type="body" idx="1"/>
+          </p:nvPr>
+        </p:nvSpPr>
+        <p:spPr>
+          <a:xfrm>
+            <a:off x="685800" y="4343400"/>
+            <a:ext cx="5486400" cy="4114800"/>
+          </a:xfrm>
+          <a:prstGeom prst="rect">
+            <a:avLst/>
+          </a:prstGeom>
+        </p:spPr>
+        <p:txBody>
+          <a:bodyPr lIns="91425" tIns="91425" rIns="91425" bIns="91425" anchor="t" anchorCtr="0">
+            <a:noAutofit/>
+          </a:bodyPr>
+          <a:lstStyle/>
+          <a:p>
+            <a:pPr lvl="0">
+              <a:spcBef>
+                <a:spcPts val="0"/>
+              </a:spcBef>
+              <a:buNone/>
+            </a:pPr>
+            <a:endParaRPr/>
+          </a:p>
+        </p:txBody>
+      </p:sp>
+    </p:spTree>
+  </p:cSld>
+  <p:clrMapOvr>
+    <a:masterClrMapping/>
+  </p:clrMapOvr>
+</p:notes>
+</file>
+
+<file path=ppt/notesSlides/notesSlide3.xml><?xml version="1.0" encoding="utf-8"?>
+<p:notes xmlns:a="http://schemas.openxmlformats.org/drawingml/2006/main" xmlns:r="http://schemas.openxmlformats.org/officeDocument/2006/relationships" xmlns:p="http://schemas.openxmlformats.org/presentationml/2006/main" showMasterSp="0" showMasterPhAnim="0">
+  <p:cSld>
+    <p:spTree>
+      <p:nvGrpSpPr>
         <p:cNvPr id="1" name="Shape 211"/>
         <p:cNvGrpSpPr/>
         <p:nvPr/>
@@ -1631,107 +1716,6 @@
           <a:lstStyle/>
           <a:p>
             <a:pPr lvl="0" rtl="0">
-              <a:spcBef>
-                <a:spcPts val="0"/>
-              </a:spcBef>
-              <a:buNone/>
-            </a:pPr>
-            <a:endParaRPr/>
-          </a:p>
-        </p:txBody>
-      </p:sp>
-    </p:spTree>
-  </p:cSld>
-  <p:clrMapOvr>
-    <a:masterClrMapping/>
-  </p:clrMapOvr>
-</p:notes>
-</file>
-
-<file path=ppt/notesSlides/notesSlide3.xml><?xml version="1.0" encoding="utf-8"?>
-<p:notes xmlns:a="http://schemas.openxmlformats.org/drawingml/2006/main" xmlns:r="http://schemas.openxmlformats.org/officeDocument/2006/relationships" xmlns:p="http://schemas.openxmlformats.org/presentationml/2006/main" showMasterSp="0" showMasterPhAnim="0">
-  <p:cSld>
-    <p:spTree>
-      <p:nvGrpSpPr>
-        <p:cNvPr id="1" name="Shape 216"/>
-        <p:cNvGrpSpPr/>
-        <p:nvPr/>
-      </p:nvGrpSpPr>
-      <p:grpSpPr>
-        <a:xfrm>
-          <a:off x="0" y="0"/>
-          <a:ext cx="0" cy="0"/>
-          <a:chOff x="0" y="0"/>
-          <a:chExt cx="0" cy="0"/>
-        </a:xfrm>
-      </p:grpSpPr>
-      <p:sp>
-        <p:nvSpPr>
-          <p:cNvPr id="217" name="Shape 217"/>
-          <p:cNvSpPr>
-            <a:spLocks noGrp="1" noRot="1" noChangeAspect="1"/>
-          </p:cNvSpPr>
-          <p:nvPr>
-            <p:ph type="sldImg" idx="2"/>
-          </p:nvPr>
-        </p:nvSpPr>
-        <p:spPr>
-          <a:xfrm>
-            <a:off x="381000" y="685800"/>
-            <a:ext cx="6096000" cy="3429000"/>
-          </a:xfrm>
-          <a:custGeom>
-            <a:avLst/>
-            <a:gdLst/>
-            <a:ahLst/>
-            <a:cxnLst/>
-            <a:rect l="0" t="0" r="0" b="0"/>
-            <a:pathLst>
-              <a:path w="120000" h="120000" extrusionOk="0">
-                <a:moveTo>
-                  <a:pt x="0" y="0"/>
-                </a:moveTo>
-                <a:lnTo>
-                  <a:pt x="120000" y="0"/>
-                </a:lnTo>
-                <a:lnTo>
-                  <a:pt x="120000" y="120000"/>
-                </a:lnTo>
-                <a:lnTo>
-                  <a:pt x="0" y="120000"/>
-                </a:lnTo>
-                <a:close/>
-              </a:path>
-            </a:pathLst>
-          </a:custGeom>
-        </p:spPr>
-      </p:sp>
-      <p:sp>
-        <p:nvSpPr>
-          <p:cNvPr id="218" name="Shape 218"/>
-          <p:cNvSpPr txBox="1">
-            <a:spLocks noGrp="1"/>
-          </p:cNvSpPr>
-          <p:nvPr>
-            <p:ph type="body" idx="1"/>
-          </p:nvPr>
-        </p:nvSpPr>
-        <p:spPr>
-          <a:xfrm>
-            <a:off x="685800" y="4343400"/>
-            <a:ext cx="5486400" cy="4114800"/>
-          </a:xfrm>
-          <a:prstGeom prst="rect">
-            <a:avLst/>
-          </a:prstGeom>
-        </p:spPr>
-        <p:txBody>
-          <a:bodyPr lIns="91425" tIns="91425" rIns="91425" bIns="91425" anchor="t" anchorCtr="0">
-            <a:noAutofit/>
-          </a:bodyPr>
-          <a:lstStyle/>
-          <a:p>
-            <a:pPr lvl="0">
               <a:spcBef>
                 <a:spcPts val="0"/>
               </a:spcBef>
@@ -2977,7 +2961,7 @@
             </a:pPr>
             <a:fld id="{00000000-1234-1234-1234-123412341234}" type="slidenum">
               <a:rPr lang="pt-BR"/>
-              <a:t>‹nº›</a:t>
+              <a:t>‹n.º›</a:t>
             </a:fld>
             <a:endParaRPr lang="pt-BR"/>
           </a:p>
@@ -3080,7 +3064,7 @@
             </a:pPr>
             <a:fld id="{00000000-1234-1234-1234-123412341234}" type="slidenum">
               <a:rPr lang="pt-BR"/>
-              <a:t>‹nº›</a:t>
+              <a:t>‹n.º›</a:t>
             </a:fld>
             <a:endParaRPr lang="pt-BR"/>
           </a:p>
@@ -3947,7 +3931,7 @@
             </a:pPr>
             <a:fld id="{00000000-1234-1234-1234-123412341234}" type="slidenum">
               <a:rPr lang="pt-BR"/>
-              <a:t>‹nº›</a:t>
+              <a:t>‹n.º›</a:t>
             </a:fld>
             <a:endParaRPr lang="pt-BR"/>
           </a:p>
@@ -4385,7 +4369,7 @@
             </a:pPr>
             <a:fld id="{00000000-1234-1234-1234-123412341234}" type="slidenum">
               <a:rPr lang="pt-BR"/>
-              <a:t>‹nº›</a:t>
+              <a:t>‹n.º›</a:t>
             </a:fld>
             <a:endParaRPr lang="pt-BR"/>
           </a:p>
@@ -4396,7 +4380,7 @@
           <p:cNvPr id="3" name="Imagem 2">
             <a:extLst>
               <a:ext uri="{FF2B5EF4-FFF2-40B4-BE49-F238E27FC236}">
-                <a16:creationId xmlns:a16="http://schemas.microsoft.com/office/drawing/2014/main" id="{239247F9-5051-48EC-9569-790C94211BD8}"/>
+                <a16:creationId xmlns:a16="http://schemas.microsoft.com/office/drawing/2014/main" xmlns="" id="{239247F9-5051-48EC-9569-790C94211BD8}"/>
               </a:ext>
             </a:extLst>
           </p:cNvPr>
@@ -4827,7 +4811,7 @@
             </a:pPr>
             <a:fld id="{00000000-1234-1234-1234-123412341234}" type="slidenum">
               <a:rPr lang="pt-BR"/>
-              <a:t>‹nº›</a:t>
+              <a:t>‹n.º›</a:t>
             </a:fld>
             <a:endParaRPr lang="pt-BR"/>
           </a:p>
@@ -5157,7 +5141,7 @@
             </a:pPr>
             <a:fld id="{00000000-1234-1234-1234-123412341234}" type="slidenum">
               <a:rPr lang="pt-BR"/>
-              <a:t>‹nº›</a:t>
+              <a:t>‹n.º›</a:t>
             </a:fld>
             <a:endParaRPr lang="pt-BR"/>
           </a:p>
@@ -6052,7 +6036,7 @@
             </a:pPr>
             <a:fld id="{00000000-1234-1234-1234-123412341234}" type="slidenum">
               <a:rPr lang="pt-BR"/>
-              <a:t>‹nº›</a:t>
+              <a:t>‹n.º›</a:t>
             </a:fld>
             <a:endParaRPr lang="pt-BR"/>
           </a:p>
@@ -6535,7 +6519,7 @@
             </a:pPr>
             <a:fld id="{00000000-1234-1234-1234-123412341234}" type="slidenum">
               <a:rPr lang="pt-BR"/>
-              <a:t>‹nº›</a:t>
+              <a:t>‹n.º›</a:t>
             </a:fld>
             <a:endParaRPr lang="pt-BR"/>
           </a:p>
@@ -6737,7 +6721,7 @@
             </a:pPr>
             <a:fld id="{00000000-1234-1234-1234-123412341234}" type="slidenum">
               <a:rPr lang="pt-BR"/>
-              <a:t>‹nº›</a:t>
+              <a:t>‹n.º›</a:t>
             </a:fld>
             <a:endParaRPr lang="pt-BR"/>
           </a:p>
@@ -7723,7 +7707,7 @@
             </a:pPr>
             <a:fld id="{00000000-1234-1234-1234-123412341234}" type="slidenum">
               <a:rPr lang="pt-BR"/>
-              <a:t>‹nº›</a:t>
+              <a:t>‹n.º›</a:t>
             </a:fld>
             <a:endParaRPr lang="pt-BR"/>
           </a:p>
@@ -8276,7 +8260,7 @@
                 <a:cs typeface="Lato"/>
                 <a:sym typeface="Lato"/>
               </a:rPr>
-              <a:t>‹nº›</a:t>
+              <a:t>‹n.º›</a:t>
             </a:fld>
             <a:endParaRPr lang="pt-BR" sz="1000">
               <a:solidFill>
@@ -8792,29 +8776,57 @@
           <a:lstStyle/>
           <a:p>
             <a:r>
-              <a:rPr lang="pt-BR" b="1" dirty="0"/>
+              <a:rPr lang="pt-BR" b="1" dirty="0">
+                <a:latin typeface="Arial" charset="0"/>
+                <a:ea typeface="Arial" charset="0"/>
+                <a:cs typeface="Arial" charset="0"/>
+              </a:rPr>
               <a:t>Consumindo API </a:t>
             </a:r>
             <a:r>
-              <a:rPr lang="pt-BR" b="1" dirty="0" err="1"/>
+              <a:rPr lang="pt-BR" b="1" dirty="0" err="1">
+                <a:latin typeface="Arial" charset="0"/>
+                <a:ea typeface="Arial" charset="0"/>
+                <a:cs typeface="Arial" charset="0"/>
+              </a:rPr>
               <a:t>Rest</a:t>
             </a:r>
             <a:r>
-              <a:rPr lang="pt-BR" b="1" dirty="0"/>
+              <a:rPr lang="pt-BR" b="1" dirty="0">
+                <a:latin typeface="Arial" charset="0"/>
+                <a:ea typeface="Arial" charset="0"/>
+                <a:cs typeface="Arial" charset="0"/>
+              </a:rPr>
               <a:t> com Angular/</a:t>
             </a:r>
             <a:r>
-              <a:rPr lang="pt-BR" b="1" dirty="0" err="1"/>
+              <a:rPr lang="pt-BR" b="1" dirty="0" err="1">
+                <a:latin typeface="Arial" charset="0"/>
+                <a:ea typeface="Arial" charset="0"/>
+                <a:cs typeface="Arial" charset="0"/>
+              </a:rPr>
               <a:t>Ionic</a:t>
             </a:r>
             <a:r>
-              <a:rPr lang="pt-BR" dirty="0"/>
+              <a:rPr lang="pt-BR" dirty="0">
+                <a:latin typeface="Arial" charset="0"/>
+                <a:ea typeface="Arial" charset="0"/>
+                <a:cs typeface="Arial" charset="0"/>
+              </a:rPr>
               <a:t/>
             </a:r>
             <a:br>
-              <a:rPr lang="pt-BR" dirty="0"/>
+              <a:rPr lang="pt-BR" dirty="0">
+                <a:latin typeface="Arial" charset="0"/>
+                <a:ea typeface="Arial" charset="0"/>
+                <a:cs typeface="Arial" charset="0"/>
+              </a:rPr>
             </a:br>
-            <a:endParaRPr sz="4800" dirty="0"/>
+            <a:endParaRPr sz="4800" dirty="0">
+              <a:latin typeface="Arial" charset="0"/>
+              <a:ea typeface="Arial" charset="0"/>
+              <a:cs typeface="Arial" charset="0"/>
+            </a:endParaRPr>
           </a:p>
         </p:txBody>
       </p:sp>
@@ -8850,15 +8862,27 @@
               <a:buNone/>
             </a:pPr>
             <a:r>
-              <a:rPr lang="pt-BR" dirty="0"/>
+              <a:rPr lang="pt-BR" dirty="0">
+                <a:latin typeface="Arial" charset="0"/>
+                <a:ea typeface="Arial" charset="0"/>
+                <a:cs typeface="Arial" charset="0"/>
+              </a:rPr>
               <a:t>Bambuí, </a:t>
             </a:r>
             <a:r>
-              <a:rPr lang="pt-BR" dirty="0" smtClean="0"/>
+              <a:rPr lang="pt-BR" dirty="0" smtClean="0">
+                <a:latin typeface="Arial" charset="0"/>
+                <a:ea typeface="Arial" charset="0"/>
+                <a:cs typeface="Arial" charset="0"/>
+              </a:rPr>
               <a:t>28 </a:t>
             </a:r>
             <a:r>
-              <a:rPr lang="pt-BR" dirty="0"/>
+              <a:rPr lang="pt-BR" dirty="0">
+                <a:latin typeface="Arial" charset="0"/>
+                <a:ea typeface="Arial" charset="0"/>
+                <a:cs typeface="Arial" charset="0"/>
+              </a:rPr>
               <a:t>de agosto de2019</a:t>
             </a:r>
           </a:p>
@@ -8924,13 +8948,13 @@
               <a:buNone/>
             </a:pPr>
             <a:r>
-              <a:rPr lang="pt-BR" sz="1950" b="1" dirty="0">
+              <a:rPr lang="pt-BR" sz="1800" b="1" dirty="0">
                 <a:solidFill>
                   <a:srgbClr val="FFFFFF"/>
                 </a:solidFill>
-                <a:latin typeface="Roboto"/>
-                <a:ea typeface="Roboto"/>
-                <a:cs typeface="Roboto"/>
+                <a:latin typeface="Arial" charset="0"/>
+                <a:ea typeface="Arial" charset="0"/>
+                <a:cs typeface="Arial" charset="0"/>
                 <a:sym typeface="Roboto"/>
               </a:rPr>
               <a:t>IV SEMANA DE ENGENHARIA, TECNOLOGIA E COMPUTAÇÃO</a:t>
@@ -8997,10 +9021,18 @@
               <a:buNone/>
             </a:pPr>
             <a:r>
-              <a:rPr lang="pt-BR" sz="1800" dirty="0" smtClean="0"/>
+              <a:rPr lang="pt-BR" sz="1800" dirty="0" smtClean="0">
+                <a:latin typeface="Arial" charset="0"/>
+                <a:ea typeface="Arial" charset="0"/>
+                <a:cs typeface="Arial" charset="0"/>
+              </a:rPr>
               <a:t>Luiz Henrique de F. R. Araújo</a:t>
             </a:r>
-            <a:endParaRPr lang="pt-BR" sz="1800" dirty="0"/>
+            <a:endParaRPr lang="pt-BR" sz="1800" dirty="0">
+              <a:latin typeface="Arial" charset="0"/>
+              <a:ea typeface="Arial" charset="0"/>
+              <a:cs typeface="Arial" charset="0"/>
+            </a:endParaRPr>
           </a:p>
         </p:txBody>
       </p:sp>
@@ -9213,7 +9245,7 @@
           <p:cNvPr id="4" name="Retângulo 3">
             <a:extLst>
               <a:ext uri="{FF2B5EF4-FFF2-40B4-BE49-F238E27FC236}">
-                <a16:creationId xmlns:a16="http://schemas.microsoft.com/office/drawing/2014/main" id="{A47566E9-0739-4467-95EE-28E8138D515E}"/>
+                <a16:creationId xmlns:a16="http://schemas.microsoft.com/office/drawing/2014/main" xmlns="" id="{A47566E9-0739-4467-95EE-28E8138D515E}"/>
               </a:ext>
             </a:extLst>
           </p:cNvPr>
@@ -9431,7 +9463,7 @@
                   <a:srgbClr val="FFFFFF"/>
                 </a:solidFill>
               </a:rPr>
-              <a:t>repojetada</a:t>
+              <a:t>reprojetada</a:t>
             </a:r>
             <a:r>
               <a:rPr lang="pt-BR" sz="2200" dirty="0" smtClean="0">
@@ -9439,7 +9471,15 @@
                   <a:srgbClr val="FFFFFF"/>
                 </a:solidFill>
               </a:rPr>
-              <a:t> para que funcione como uma biblioteca independente de componentes Web. Pode ser usada com </a:t>
+              <a:t> </a:t>
+            </a:r>
+            <a:r>
+              <a:rPr lang="pt-BR" sz="2200" dirty="0" smtClean="0">
+                <a:solidFill>
+                  <a:srgbClr val="FFFFFF"/>
+                </a:solidFill>
+              </a:rPr>
+              <a:t>para que funcione como uma biblioteca independente de componentes Web. Pode ser usada com </a:t>
             </a:r>
             <a:r>
               <a:rPr lang="pt-BR" sz="2200" dirty="0" err="1" smtClean="0">
@@ -9497,7 +9537,7 @@
           <p:cNvPr id="4" name="Retângulo 3">
             <a:extLst>
               <a:ext uri="{FF2B5EF4-FFF2-40B4-BE49-F238E27FC236}">
-                <a16:creationId xmlns:a16="http://schemas.microsoft.com/office/drawing/2014/main" id="{A47566E9-0739-4467-95EE-28E8138D515E}"/>
+                <a16:creationId xmlns:a16="http://schemas.microsoft.com/office/drawing/2014/main" xmlns="" id="{A47566E9-0739-4467-95EE-28E8138D515E}"/>
               </a:ext>
             </a:extLst>
           </p:cNvPr>
@@ -9606,10 +9646,18 @@
               <a:buNone/>
             </a:pPr>
             <a:r>
-              <a:rPr lang="pt-BR" sz="4000" b="1" dirty="0" smtClean="0"/>
+              <a:rPr lang="pt-BR" sz="3600" b="1" dirty="0" smtClean="0">
+                <a:latin typeface="Arial" charset="0"/>
+                <a:ea typeface="Arial" charset="0"/>
+                <a:cs typeface="Arial" charset="0"/>
+              </a:rPr>
               <a:t>DESENVOLVIMENTO</a:t>
             </a:r>
-            <a:endParaRPr lang="pt-BR" sz="4000" b="1" dirty="0"/>
+            <a:endParaRPr lang="pt-BR" sz="4000" b="1" dirty="0">
+              <a:latin typeface="Arial" charset="0"/>
+              <a:ea typeface="Arial" charset="0"/>
+              <a:cs typeface="Arial" charset="0"/>
+            </a:endParaRPr>
           </a:p>
         </p:txBody>
       </p:sp>
@@ -9881,7 +9929,7 @@
           <p:cNvPr id="4" name="Retângulo 3">
             <a:extLst>
               <a:ext uri="{FF2B5EF4-FFF2-40B4-BE49-F238E27FC236}">
-                <a16:creationId xmlns:a16="http://schemas.microsoft.com/office/drawing/2014/main" id="{A47566E9-0739-4467-95EE-28E8138D515E}"/>
+                <a16:creationId xmlns:a16="http://schemas.microsoft.com/office/drawing/2014/main" xmlns="" id="{A47566E9-0739-4467-95EE-28E8138D515E}"/>
               </a:ext>
             </a:extLst>
           </p:cNvPr>
@@ -9942,7 +9990,7 @@
 </file>
 
 <file path=ppt/slides/slide14.xml><?xml version="1.0" encoding="utf-8"?>
-<p:sld xmlns:a="http://schemas.openxmlformats.org/drawingml/2006/main" xmlns:r="http://schemas.openxmlformats.org/officeDocument/2006/relationships" xmlns:p="http://schemas.openxmlformats.org/presentationml/2006/main">
+<p:sld xmlns:a="http://schemas.openxmlformats.org/drawingml/2006/main" xmlns:r="http://schemas.openxmlformats.org/officeDocument/2006/relationships" xmlns:p="http://schemas.openxmlformats.org/presentationml/2006/main" show="0">
   <p:cSld>
     <p:spTree>
       <p:nvGrpSpPr>
@@ -9990,7 +10038,11 @@
               <a:buNone/>
             </a:pPr>
             <a:r>
-              <a:rPr lang="pt-BR" sz="4000" b="1"/>
+              <a:rPr lang="pt-BR" sz="4000" b="1" dirty="0">
+                <a:latin typeface="Arial" charset="0"/>
+                <a:ea typeface="Arial" charset="0"/>
+                <a:cs typeface="Arial" charset="0"/>
+              </a:rPr>
               <a:t>RESULTADOS E DISCUSSÕES</a:t>
             </a:r>
           </a:p>
@@ -10006,11 +10058,19 @@
   <p:clrMapOvr>
     <a:masterClrMapping/>
   </p:clrMapOvr>
+  <mc:AlternateContent xmlns:mc="http://schemas.openxmlformats.org/markup-compatibility/2006">
+    <mc:Choice xmlns:p14="http://schemas.microsoft.com/office/powerpoint/2010/main" Requires="p14">
+      <p:transition spd="slow" p14:dur="2000"/>
+    </mc:Choice>
+    <mc:Fallback>
+      <p:transition spd="slow"/>
+    </mc:Fallback>
+  </mc:AlternateContent>
 </p:sld>
 </file>
 
 <file path=ppt/slides/slide15.xml><?xml version="1.0" encoding="utf-8"?>
-<p:sld xmlns:a="http://schemas.openxmlformats.org/drawingml/2006/main" xmlns:r="http://schemas.openxmlformats.org/officeDocument/2006/relationships" xmlns:p="http://schemas.openxmlformats.org/presentationml/2006/main">
+<p:sld xmlns:a="http://schemas.openxmlformats.org/drawingml/2006/main" xmlns:r="http://schemas.openxmlformats.org/officeDocument/2006/relationships" xmlns:p="http://schemas.openxmlformats.org/presentationml/2006/main" show="0">
   <p:cSld>
     <p:spTree>
       <p:nvGrpSpPr>
@@ -10157,7 +10217,7 @@
           <p:cNvPr id="4" name="Retângulo 3">
             <a:extLst>
               <a:ext uri="{FF2B5EF4-FFF2-40B4-BE49-F238E27FC236}">
-                <a16:creationId xmlns:a16="http://schemas.microsoft.com/office/drawing/2014/main" id="{F40B6EFB-8BB7-4C38-8BC2-42842816D5CB}"/>
+                <a16:creationId xmlns:a16="http://schemas.microsoft.com/office/drawing/2014/main" xmlns="" id="{F40B6EFB-8BB7-4C38-8BC2-42842816D5CB}"/>
               </a:ext>
             </a:extLst>
           </p:cNvPr>
@@ -10209,6 +10269,14 @@
   <p:clrMapOvr>
     <a:masterClrMapping/>
   </p:clrMapOvr>
+  <mc:AlternateContent xmlns:mc="http://schemas.openxmlformats.org/markup-compatibility/2006">
+    <mc:Choice xmlns:p14="http://schemas.microsoft.com/office/powerpoint/2010/main" Requires="p14">
+      <p:transition spd="slow" p14:dur="2000"/>
+    </mc:Choice>
+    <mc:Fallback>
+      <p:transition spd="slow"/>
+    </mc:Fallback>
+  </mc:AlternateContent>
 </p:sld>
 </file>
 
@@ -10261,7 +10329,11 @@
               <a:buNone/>
             </a:pPr>
             <a:r>
-              <a:rPr lang="pt-BR" sz="4000" b="1"/>
+              <a:rPr lang="pt-BR" sz="4000" b="1" dirty="0">
+                <a:latin typeface="Arial" charset="0"/>
+                <a:ea typeface="Arial" charset="0"/>
+                <a:cs typeface="Arial" charset="0"/>
+              </a:rPr>
               <a:t>CONCLUSÃO E CONSIDERAÇÕES FINAIS</a:t>
             </a:r>
           </a:p>
@@ -10527,7 +10599,7 @@
           <p:cNvPr id="4" name="Retângulo 3">
             <a:extLst>
               <a:ext uri="{FF2B5EF4-FFF2-40B4-BE49-F238E27FC236}">
-                <a16:creationId xmlns:a16="http://schemas.microsoft.com/office/drawing/2014/main" id="{798F9916-50E3-469F-A219-3B7DD99C6900}"/>
+                <a16:creationId xmlns:a16="http://schemas.microsoft.com/office/drawing/2014/main" xmlns="" id="{798F9916-50E3-469F-A219-3B7DD99C6900}"/>
               </a:ext>
             </a:extLst>
           </p:cNvPr>
@@ -10631,13 +10703,25 @@
               <a:buNone/>
             </a:pPr>
             <a:r>
-              <a:rPr lang="pt-BR" sz="4000" b="1" dirty="0" smtClean="0"/>
+              <a:rPr lang="pt-BR" sz="4000" b="1" dirty="0" smtClean="0">
+                <a:latin typeface="Arial" charset="0"/>
+                <a:ea typeface="Arial" charset="0"/>
+                <a:cs typeface="Arial" charset="0"/>
+              </a:rPr>
               <a:t>OBRIGADO!</a:t>
             </a:r>
             <a:br>
-              <a:rPr lang="pt-BR" sz="4000" b="1" dirty="0" smtClean="0"/>
+              <a:rPr lang="pt-BR" sz="4000" b="1" dirty="0" smtClean="0">
+                <a:latin typeface="Arial" charset="0"/>
+                <a:ea typeface="Arial" charset="0"/>
+                <a:cs typeface="Arial" charset="0"/>
+              </a:rPr>
             </a:br>
-            <a:endParaRPr lang="pt-BR" sz="4000" b="1" dirty="0"/>
+            <a:endParaRPr lang="pt-BR" sz="4000" b="1" dirty="0">
+              <a:latin typeface="Arial" charset="0"/>
+              <a:ea typeface="Arial" charset="0"/>
+              <a:cs typeface="Arial" charset="0"/>
+            </a:endParaRPr>
           </a:p>
         </p:txBody>
       </p:sp>
@@ -10869,26 +10953,49 @@
             <a:pPr marL="342900"/>
             <a:r>
               <a:rPr lang="pt-BR" sz="2000" b="1" dirty="0" smtClean="0">
+                <a:latin typeface="Arial" charset="0"/>
+                <a:ea typeface="Arial" charset="0"/>
+                <a:cs typeface="Arial" charset="0"/>
                 <a:hlinkClick r:id="rId3"/>
               </a:rPr>
               <a:t>LUIZHBD@GMAIL.COM</a:t>
             </a:r>
-            <a:endParaRPr lang="pt-BR" sz="2000" b="1" dirty="0" smtClean="0"/>
+            <a:endParaRPr lang="pt-BR" sz="2000" b="1" dirty="0" smtClean="0">
+              <a:latin typeface="Arial" charset="0"/>
+              <a:ea typeface="Arial" charset="0"/>
+              <a:cs typeface="Arial" charset="0"/>
+            </a:endParaRPr>
           </a:p>
           <a:p>
             <a:pPr marL="342900"/>
             <a:r>
-              <a:rPr lang="pt-BR" sz="2000" b="1" dirty="0" smtClean="0"/>
+              <a:rPr lang="pt-BR" sz="2000" b="1" dirty="0" smtClean="0">
+                <a:latin typeface="Arial" charset="0"/>
+                <a:ea typeface="Arial" charset="0"/>
+                <a:cs typeface="Arial" charset="0"/>
+              </a:rPr>
               <a:t>GITHUB.COM/LUIZHFRARAUJO</a:t>
             </a:r>
             <a:r>
-              <a:rPr lang="pt-BR" sz="4000" b="1" dirty="0" smtClean="0"/>
+              <a:rPr lang="pt-BR" sz="4000" b="1" dirty="0" smtClean="0">
+                <a:latin typeface="Arial" charset="0"/>
+                <a:ea typeface="Arial" charset="0"/>
+                <a:cs typeface="Arial" charset="0"/>
+              </a:rPr>
               <a:t/>
             </a:r>
             <a:br>
-              <a:rPr lang="pt-BR" sz="4000" b="1" dirty="0" smtClean="0"/>
+              <a:rPr lang="pt-BR" sz="4000" b="1" dirty="0" smtClean="0">
+                <a:latin typeface="Arial" charset="0"/>
+                <a:ea typeface="Arial" charset="0"/>
+                <a:cs typeface="Arial" charset="0"/>
+              </a:rPr>
             </a:br>
-            <a:endParaRPr lang="pt-BR" sz="4000" b="1" dirty="0"/>
+            <a:endParaRPr lang="pt-BR" sz="4000" b="1" dirty="0">
+              <a:latin typeface="Arial" charset="0"/>
+              <a:ea typeface="Arial" charset="0"/>
+              <a:cs typeface="Arial" charset="0"/>
+            </a:endParaRPr>
           </a:p>
         </p:txBody>
       </p:sp>
@@ -10906,69 +11013,6 @@
 </file>
 
 <file path=ppt/slides/slide2.xml><?xml version="1.0" encoding="utf-8"?>
-<p:sld xmlns:a="http://schemas.openxmlformats.org/drawingml/2006/main" xmlns:r="http://schemas.openxmlformats.org/officeDocument/2006/relationships" xmlns:p="http://schemas.openxmlformats.org/presentationml/2006/main">
-  <p:cSld>
-    <p:spTree>
-      <p:nvGrpSpPr>
-        <p:cNvPr id="1" name="Shape 214"/>
-        <p:cNvGrpSpPr/>
-        <p:nvPr/>
-      </p:nvGrpSpPr>
-      <p:grpSpPr>
-        <a:xfrm>
-          <a:off x="0" y="0"/>
-          <a:ext cx="0" cy="0"/>
-          <a:chOff x="0" y="0"/>
-          <a:chExt cx="0" cy="0"/>
-        </a:xfrm>
-      </p:grpSpPr>
-      <p:sp>
-        <p:nvSpPr>
-          <p:cNvPr id="215" name="Shape 215"/>
-          <p:cNvSpPr txBox="1">
-            <a:spLocks noGrp="1"/>
-          </p:cNvSpPr>
-          <p:nvPr>
-            <p:ph type="title"/>
-          </p:nvPr>
-        </p:nvSpPr>
-        <p:spPr>
-          <a:xfrm>
-            <a:off x="823850" y="2053000"/>
-            <a:ext cx="4587000" cy="1148700"/>
-          </a:xfrm>
-          <a:prstGeom prst="rect">
-            <a:avLst/>
-          </a:prstGeom>
-        </p:spPr>
-        <p:txBody>
-          <a:bodyPr lIns="91425" tIns="91425" rIns="91425" bIns="91425" anchor="ctr" anchorCtr="0">
-            <a:noAutofit/>
-          </a:bodyPr>
-          <a:lstStyle/>
-          <a:p>
-            <a:pPr marL="342900" lvl="0" algn="ctr" rtl="0">
-              <a:spcBef>
-                <a:spcPts val="0"/>
-              </a:spcBef>
-              <a:buNone/>
-            </a:pPr>
-            <a:r>
-              <a:rPr lang="pt-BR" sz="4000" b="1"/>
-              <a:t>INTRODUÇÃO</a:t>
-            </a:r>
-          </a:p>
-        </p:txBody>
-      </p:sp>
-    </p:spTree>
-  </p:cSld>
-  <p:clrMapOvr>
-    <a:masterClrMapping/>
-  </p:clrMapOvr>
-</p:sld>
-</file>
-
-<file path=ppt/slides/slide3.xml><?xml version="1.0" encoding="utf-8"?>
 <p:sld xmlns:a="http://schemas.openxmlformats.org/drawingml/2006/main" xmlns:r="http://schemas.openxmlformats.org/officeDocument/2006/relationships" xmlns:p="http://schemas.openxmlformats.org/presentationml/2006/main">
   <p:cSld>
     <p:spTree>
@@ -11153,7 +11197,7 @@
           <p:cNvPr id="4" name="Retângulo 3">
             <a:extLst>
               <a:ext uri="{FF2B5EF4-FFF2-40B4-BE49-F238E27FC236}">
-                <a16:creationId xmlns:a16="http://schemas.microsoft.com/office/drawing/2014/main" id="{F0A7E80D-4995-4489-A5A7-3CEDB08285AF}"/>
+                <a16:creationId xmlns:a16="http://schemas.microsoft.com/office/drawing/2014/main" xmlns="" id="{F0A7E80D-4995-4489-A5A7-3CEDB08285AF}"/>
               </a:ext>
             </a:extLst>
           </p:cNvPr>
@@ -11197,6 +11241,73 @@
           <a:p>
             <a:pPr algn="ctr"/>
             <a:endParaRPr lang="pt-BR"/>
+          </a:p>
+        </p:txBody>
+      </p:sp>
+    </p:spTree>
+  </p:cSld>
+  <p:clrMapOvr>
+    <a:masterClrMapping/>
+  </p:clrMapOvr>
+</p:sld>
+</file>
+
+<file path=ppt/slides/slide3.xml><?xml version="1.0" encoding="utf-8"?>
+<p:sld xmlns:a="http://schemas.openxmlformats.org/drawingml/2006/main" xmlns:r="http://schemas.openxmlformats.org/officeDocument/2006/relationships" xmlns:p="http://schemas.openxmlformats.org/presentationml/2006/main">
+  <p:cSld>
+    <p:spTree>
+      <p:nvGrpSpPr>
+        <p:cNvPr id="1" name="Shape 214"/>
+        <p:cNvGrpSpPr/>
+        <p:nvPr/>
+      </p:nvGrpSpPr>
+      <p:grpSpPr>
+        <a:xfrm>
+          <a:off x="0" y="0"/>
+          <a:ext cx="0" cy="0"/>
+          <a:chOff x="0" y="0"/>
+          <a:chExt cx="0" cy="0"/>
+        </a:xfrm>
+      </p:grpSpPr>
+      <p:sp>
+        <p:nvSpPr>
+          <p:cNvPr id="215" name="Shape 215"/>
+          <p:cNvSpPr txBox="1">
+            <a:spLocks noGrp="1"/>
+          </p:cNvSpPr>
+          <p:nvPr>
+            <p:ph type="title"/>
+          </p:nvPr>
+        </p:nvSpPr>
+        <p:spPr>
+          <a:xfrm>
+            <a:off x="823850" y="2053000"/>
+            <a:ext cx="4587000" cy="1148700"/>
+          </a:xfrm>
+          <a:prstGeom prst="rect">
+            <a:avLst/>
+          </a:prstGeom>
+        </p:spPr>
+        <p:txBody>
+          <a:bodyPr lIns="91425" tIns="91425" rIns="91425" bIns="91425" anchor="ctr" anchorCtr="0">
+            <a:noAutofit/>
+          </a:bodyPr>
+          <a:lstStyle/>
+          <a:p>
+            <a:pPr marL="342900" lvl="0" algn="ctr" rtl="0">
+              <a:spcBef>
+                <a:spcPts val="0"/>
+              </a:spcBef>
+              <a:buNone/>
+            </a:pPr>
+            <a:r>
+              <a:rPr lang="pt-BR" sz="4000" b="1" dirty="0">
+                <a:latin typeface="Arial" charset="0"/>
+                <a:ea typeface="Arial" charset="0"/>
+                <a:cs typeface="Arial" charset="0"/>
+              </a:rPr>
+              <a:t>INTRODUÇÃO</a:t>
+            </a:r>
           </a:p>
         </p:txBody>
       </p:sp>
@@ -11433,7 +11544,7 @@
           <p:cNvPr id="4" name="Retângulo 3">
             <a:extLst>
               <a:ext uri="{FF2B5EF4-FFF2-40B4-BE49-F238E27FC236}">
-                <a16:creationId xmlns:a16="http://schemas.microsoft.com/office/drawing/2014/main" id="{F0A7E80D-4995-4489-A5A7-3CEDB08285AF}"/>
+                <a16:creationId xmlns:a16="http://schemas.microsoft.com/office/drawing/2014/main" xmlns="" id="{F0A7E80D-4995-4489-A5A7-3CEDB08285AF}"/>
               </a:ext>
             </a:extLst>
           </p:cNvPr>
@@ -11542,7 +11653,11 @@
               <a:buNone/>
             </a:pPr>
             <a:r>
-              <a:rPr lang="pt-BR" sz="4000" b="1"/>
+              <a:rPr lang="pt-BR" sz="4000" b="1" dirty="0">
+                <a:latin typeface="Arial" charset="0"/>
+                <a:ea typeface="Arial" charset="0"/>
+                <a:cs typeface="Arial" charset="0"/>
+              </a:rPr>
               <a:t>OBJETIVO</a:t>
             </a:r>
           </a:p>
@@ -11834,7 +11949,7 @@
           <p:cNvPr id="4" name="Retângulo 3">
             <a:extLst>
               <a:ext uri="{FF2B5EF4-FFF2-40B4-BE49-F238E27FC236}">
-                <a16:creationId xmlns:a16="http://schemas.microsoft.com/office/drawing/2014/main" id="{73972FC9-CF4D-4DEF-A32C-F0269AD06D40}"/>
+                <a16:creationId xmlns:a16="http://schemas.microsoft.com/office/drawing/2014/main" xmlns="" id="{73972FC9-CF4D-4DEF-A32C-F0269AD06D40}"/>
               </a:ext>
             </a:extLst>
           </p:cNvPr>
@@ -11938,18 +12053,34 @@
               <a:buNone/>
             </a:pPr>
             <a:r>
-              <a:rPr lang="pt-BR" sz="3600" b="1" dirty="0" smtClean="0"/>
+              <a:rPr lang="pt-BR" sz="3600" b="1" dirty="0" smtClean="0">
+                <a:latin typeface="Arial" charset="0"/>
+                <a:ea typeface="Arial" charset="0"/>
+                <a:cs typeface="Arial" charset="0"/>
+              </a:rPr>
               <a:t>O que é API, Angular e </a:t>
             </a:r>
             <a:r>
-              <a:rPr lang="pt-BR" sz="3600" b="1" dirty="0" err="1" smtClean="0"/>
+              <a:rPr lang="pt-BR" sz="3600" b="1" dirty="0" err="1" smtClean="0">
+                <a:latin typeface="Arial" charset="0"/>
+                <a:ea typeface="Arial" charset="0"/>
+                <a:cs typeface="Arial" charset="0"/>
+              </a:rPr>
               <a:t>Ionic</a:t>
             </a:r>
             <a:r>
-              <a:rPr lang="pt-BR" sz="3600" b="1" dirty="0" smtClean="0"/>
+              <a:rPr lang="pt-BR" sz="3600" b="1" dirty="0" smtClean="0">
+                <a:latin typeface="Arial" charset="0"/>
+                <a:ea typeface="Arial" charset="0"/>
+                <a:cs typeface="Arial" charset="0"/>
+              </a:rPr>
               <a:t>?</a:t>
             </a:r>
-            <a:endParaRPr lang="pt-BR" sz="3600" b="1" dirty="0"/>
+            <a:endParaRPr lang="pt-BR" sz="3600" b="1" dirty="0">
+              <a:latin typeface="Arial" charset="0"/>
+              <a:ea typeface="Arial" charset="0"/>
+              <a:cs typeface="Arial" charset="0"/>
+            </a:endParaRPr>
           </a:p>
         </p:txBody>
       </p:sp>
@@ -12117,7 +12248,7 @@
           <p:cNvPr id="4" name="Retângulo 3">
             <a:extLst>
               <a:ext uri="{FF2B5EF4-FFF2-40B4-BE49-F238E27FC236}">
-                <a16:creationId xmlns:a16="http://schemas.microsoft.com/office/drawing/2014/main" id="{A47566E9-0739-4467-95EE-28E8138D515E}"/>
+                <a16:creationId xmlns:a16="http://schemas.microsoft.com/office/drawing/2014/main" xmlns="" id="{A47566E9-0739-4467-95EE-28E8138D515E}"/>
               </a:ext>
             </a:extLst>
           </p:cNvPr>
@@ -12336,7 +12467,7 @@
           <p:cNvPr id="4" name="Retângulo 3">
             <a:extLst>
               <a:ext uri="{FF2B5EF4-FFF2-40B4-BE49-F238E27FC236}">
-                <a16:creationId xmlns:a16="http://schemas.microsoft.com/office/drawing/2014/main" id="{A47566E9-0739-4467-95EE-28E8138D515E}"/>
+                <a16:creationId xmlns:a16="http://schemas.microsoft.com/office/drawing/2014/main" xmlns="" id="{A47566E9-0739-4467-95EE-28E8138D515E}"/>
               </a:ext>
             </a:extLst>
           </p:cNvPr>

</xml_diff>